<commit_message>
introduced automatic retry with timeout after communicaiton failre
</commit_message>
<xml_diff>
--- a/cad/Walter-Lettering.pptx
+++ b/cad/Walter-Lettering.pptx
@@ -3024,11 +3024,11 @@
           <a:lstStyle/>
           <a:p>
             <a:pPr algn="ctr"/>
-            <a:endParaRPr lang="de-DE" sz="1400" b="1">
+            <a:endParaRPr lang="de-DE" sz="1400" spc="100">
               <a:solidFill>
                 <a:schemeClr val="tx1"/>
               </a:solidFill>
-              <a:latin typeface="Candara" panose="020E0502030303020204" pitchFamily="34" charset="0"/>
+              <a:latin typeface="BankGothic Lt BT" panose="020B0607020203060204" pitchFamily="34" charset="0"/>
               <a:cs typeface="Leelawadee UI Semilight" panose="020B0402040204020203" pitchFamily="34" charset="-34"/>
             </a:endParaRPr>
           </a:p>
@@ -3095,20 +3095,20 @@
             <a:p>
               <a:pPr algn="ctr"/>
               <a:r>
-                <a:rPr lang="de-DE" sz="1400" b="1" dirty="0" err="1" smtClean="0">
+                <a:rPr lang="de-DE" sz="1200" cap="all" dirty="0" err="1" smtClean="0">
                   <a:solidFill>
                     <a:schemeClr val="tx1"/>
                   </a:solidFill>
-                  <a:latin typeface="Candara" panose="020E0502030303020204" pitchFamily="34" charset="0"/>
+                  <a:latin typeface="BankGothic Lt BT" panose="020B0607020203060204" pitchFamily="34" charset="0"/>
                   <a:cs typeface="Leelawadee UI Semilight" panose="020B0402040204020203" pitchFamily="34" charset="-34"/>
                 </a:rPr>
                 <a:t>Heartbeat</a:t>
               </a:r>
-              <a:endParaRPr lang="de-DE" sz="1400" b="1" dirty="0">
+              <a:endParaRPr lang="de-DE" sz="1200" cap="all" dirty="0">
                 <a:solidFill>
                   <a:schemeClr val="tx1"/>
                 </a:solidFill>
-                <a:latin typeface="Candara" panose="020E0502030303020204" pitchFamily="34" charset="0"/>
+                <a:latin typeface="BankGothic Lt BT" panose="020B0607020203060204" pitchFamily="34" charset="0"/>
                 <a:cs typeface="Leelawadee UI Semilight" panose="020B0402040204020203" pitchFamily="34" charset="-34"/>
               </a:endParaRPr>
             </a:p>
@@ -3161,20 +3161,20 @@
             <a:p>
               <a:pPr algn="ctr"/>
               <a:r>
-                <a:rPr lang="de-DE" sz="1400" b="1" dirty="0" smtClean="0">
+                <a:rPr lang="de-DE" sz="1200" cap="all" dirty="0" smtClean="0">
                   <a:solidFill>
                     <a:schemeClr val="tx1"/>
                   </a:solidFill>
-                  <a:latin typeface="Candara" panose="020E0502030303020204" pitchFamily="34" charset="0"/>
+                  <a:latin typeface="BankGothic Lt BT" panose="020B0607020203060204" pitchFamily="34" charset="0"/>
                   <a:cs typeface="Leelawadee UI Semilight" panose="020B0402040204020203" pitchFamily="34" charset="-34"/>
                 </a:rPr>
                 <a:t>Setup</a:t>
               </a:r>
-              <a:endParaRPr lang="de-DE" sz="1400" b="1" dirty="0" smtClean="0">
+              <a:endParaRPr lang="de-DE" sz="1200" cap="all" dirty="0" smtClean="0">
                 <a:solidFill>
                   <a:schemeClr val="tx1"/>
                 </a:solidFill>
-                <a:latin typeface="Candara" panose="020E0502030303020204" pitchFamily="34" charset="0"/>
+                <a:latin typeface="BankGothic Lt BT" panose="020B0607020203060204" pitchFamily="34" charset="0"/>
                 <a:cs typeface="Leelawadee UI Semilight" panose="020B0402040204020203" pitchFamily="34" charset="-34"/>
               </a:endParaRPr>
             </a:p>
@@ -3227,11 +3227,11 @@
             <a:p>
               <a:pPr algn="ctr"/>
               <a:r>
-                <a:rPr lang="de-DE" sz="1400" b="1" dirty="0" smtClean="0">
+                <a:rPr lang="de-DE" sz="1200" cap="all" dirty="0" smtClean="0">
                   <a:solidFill>
                     <a:schemeClr val="tx1"/>
                   </a:solidFill>
-                  <a:latin typeface="Candara" panose="020E0502030303020204" pitchFamily="34" charset="0"/>
+                  <a:latin typeface="BankGothic Lt BT" panose="020B0607020203060204" pitchFamily="34" charset="0"/>
                   <a:cs typeface="Leelawadee UI Semilight" panose="020B0402040204020203" pitchFamily="34" charset="-34"/>
                 </a:rPr>
                 <a:t>Power</a:t>
@@ -3240,20 +3240,20 @@
             <a:p>
               <a:pPr algn="ctr"/>
               <a:r>
-                <a:rPr lang="de-DE" sz="1400" b="1" dirty="0" smtClean="0">
+                <a:rPr lang="de-DE" sz="1200" cap="all" dirty="0" smtClean="0">
                   <a:solidFill>
                     <a:schemeClr val="tx1"/>
                   </a:solidFill>
-                  <a:latin typeface="Candara" panose="020E0502030303020204" pitchFamily="34" charset="0"/>
+                  <a:latin typeface="BankGothic Lt BT" panose="020B0607020203060204" pitchFamily="34" charset="0"/>
                   <a:cs typeface="Leelawadee UI Semilight" panose="020B0402040204020203" pitchFamily="34" charset="-34"/>
                 </a:rPr>
                 <a:t>On</a:t>
               </a:r>
-              <a:endParaRPr lang="de-DE" sz="1400" b="1" dirty="0" smtClean="0">
+              <a:endParaRPr lang="de-DE" sz="1200" cap="all" dirty="0" smtClean="0">
                 <a:solidFill>
                   <a:schemeClr val="tx1"/>
                 </a:solidFill>
-                <a:latin typeface="Candara" panose="020E0502030303020204" pitchFamily="34" charset="0"/>
+                <a:latin typeface="BankGothic Lt BT" panose="020B0607020203060204" pitchFamily="34" charset="0"/>
                 <a:cs typeface="Leelawadee UI Semilight" panose="020B0402040204020203" pitchFamily="34" charset="-34"/>
               </a:endParaRPr>
             </a:p>
@@ -3306,30 +3306,30 @@
             <a:p>
               <a:pPr algn="ctr"/>
               <a:r>
-                <a:rPr lang="de-DE" sz="1400" b="1" dirty="0" smtClean="0">
+                <a:rPr lang="de-DE" sz="1200" cap="all" dirty="0" smtClean="0">
                   <a:solidFill>
                     <a:schemeClr val="tx1"/>
                   </a:solidFill>
-                  <a:latin typeface="Candara" panose="020E0502030303020204" pitchFamily="34" charset="0"/>
+                  <a:latin typeface="BankGothic Lt BT" panose="020B0607020203060204" pitchFamily="34" charset="0"/>
                   <a:cs typeface="Leelawadee UI Semilight" panose="020B0402040204020203" pitchFamily="34" charset="-34"/>
                 </a:rPr>
                 <a:t>Enable</a:t>
               </a:r>
               <a:r>
-                <a:rPr lang="de-DE" sz="1400" b="1" dirty="0">
+                <a:rPr lang="de-DE" sz="1200" cap="all" dirty="0">
                   <a:solidFill>
                     <a:schemeClr val="tx1"/>
                   </a:solidFill>
-                  <a:latin typeface="Candara" panose="020E0502030303020204" pitchFamily="34" charset="0"/>
+                  <a:latin typeface="BankGothic Lt BT" panose="020B0607020203060204" pitchFamily="34" charset="0"/>
                   <a:cs typeface="Leelawadee UI Semilight" panose="020B0402040204020203" pitchFamily="34" charset="-34"/>
                 </a:rPr>
                 <a:t>d</a:t>
               </a:r>
-              <a:endParaRPr lang="de-DE" sz="1400" b="1" dirty="0" smtClean="0">
+              <a:endParaRPr lang="de-DE" sz="1200" cap="all" dirty="0" smtClean="0">
                 <a:solidFill>
                   <a:schemeClr val="tx1"/>
                 </a:solidFill>
-                <a:latin typeface="Candara" panose="020E0502030303020204" pitchFamily="34" charset="0"/>
+                <a:latin typeface="BankGothic Lt BT" panose="020B0607020203060204" pitchFamily="34" charset="0"/>
                 <a:cs typeface="Leelawadee UI Semilight" panose="020B0402040204020203" pitchFamily="34" charset="-34"/>
               </a:endParaRPr>
             </a:p>
@@ -3382,40 +3382,40 @@
             <a:p>
               <a:pPr algn="ctr"/>
               <a:r>
-                <a:rPr lang="de-DE" sz="1400" b="1" dirty="0" err="1" smtClean="0">
+                <a:rPr lang="de-DE" sz="1200" cap="all" dirty="0" err="1" smtClean="0">
                   <a:solidFill>
                     <a:schemeClr val="tx1"/>
                   </a:solidFill>
-                  <a:latin typeface="Candara" panose="020E0502030303020204" pitchFamily="34" charset="0"/>
+                  <a:latin typeface="BankGothic Lt BT" panose="020B0607020203060204" pitchFamily="34" charset="0"/>
                   <a:cs typeface="Leelawadee UI Semilight" panose="020B0402040204020203" pitchFamily="34" charset="-34"/>
                 </a:rPr>
                 <a:t>Trajectory</a:t>
               </a:r>
-              <a:endParaRPr lang="de-DE" sz="1400" b="1" dirty="0" smtClean="0">
+              <a:endParaRPr lang="de-DE" sz="1200" cap="all" dirty="0" smtClean="0">
                 <a:solidFill>
                   <a:schemeClr val="tx1"/>
                 </a:solidFill>
-                <a:latin typeface="Candara" panose="020E0502030303020204" pitchFamily="34" charset="0"/>
+                <a:latin typeface="BankGothic Lt BT" panose="020B0607020203060204" pitchFamily="34" charset="0"/>
                 <a:cs typeface="Leelawadee UI Semilight" panose="020B0402040204020203" pitchFamily="34" charset="-34"/>
               </a:endParaRPr>
             </a:p>
             <a:p>
               <a:pPr algn="ctr"/>
               <a:r>
-                <a:rPr lang="de-DE" sz="1400" b="1" dirty="0" err="1" smtClean="0">
+                <a:rPr lang="de-DE" sz="1200" cap="all" dirty="0" err="1" smtClean="0">
                   <a:solidFill>
                     <a:schemeClr val="tx1"/>
                   </a:solidFill>
-                  <a:latin typeface="Candara" panose="020E0502030303020204" pitchFamily="34" charset="0"/>
+                  <a:latin typeface="BankGothic Lt BT" panose="020B0607020203060204" pitchFamily="34" charset="0"/>
                   <a:cs typeface="Leelawadee UI Semilight" panose="020B0402040204020203" pitchFamily="34" charset="-34"/>
                 </a:rPr>
                 <a:t>control</a:t>
               </a:r>
-              <a:endParaRPr lang="de-DE" sz="1400" b="1" dirty="0" smtClean="0">
+              <a:endParaRPr lang="de-DE" sz="1200" cap="all" dirty="0" smtClean="0">
                 <a:solidFill>
                   <a:schemeClr val="tx1"/>
                 </a:solidFill>
-                <a:latin typeface="Candara" panose="020E0502030303020204" pitchFamily="34" charset="0"/>
+                <a:latin typeface="BankGothic Lt BT" panose="020B0607020203060204" pitchFamily="34" charset="0"/>
                 <a:cs typeface="Leelawadee UI Semilight" panose="020B0402040204020203" pitchFamily="34" charset="-34"/>
               </a:endParaRPr>
             </a:p>
@@ -3468,11 +3468,11 @@
             <a:p>
               <a:pPr algn="ctr"/>
               <a:r>
-                <a:rPr lang="de-DE" sz="1400" b="1" dirty="0" smtClean="0">
+                <a:rPr lang="de-DE" sz="1200" cap="all" dirty="0" smtClean="0">
                   <a:solidFill>
                     <a:schemeClr val="tx1"/>
                   </a:solidFill>
-                  <a:latin typeface="Candara" panose="020E0502030303020204" pitchFamily="34" charset="0"/>
+                  <a:latin typeface="BankGothic Lt BT" panose="020B0607020203060204" pitchFamily="34" charset="0"/>
                   <a:cs typeface="Leelawadee UI Semilight" panose="020B0402040204020203" pitchFamily="34" charset="-34"/>
                 </a:rPr>
                 <a:t>Pose </a:t>
@@ -3481,20 +3481,20 @@
             <a:p>
               <a:pPr algn="ctr"/>
               <a:r>
-                <a:rPr lang="de-DE" sz="1400" b="1" dirty="0" smtClean="0">
+                <a:rPr lang="de-DE" sz="1200" cap="all" dirty="0" smtClean="0">
                   <a:solidFill>
                     <a:schemeClr val="tx1"/>
                   </a:solidFill>
-                  <a:latin typeface="Candara" panose="020E0502030303020204" pitchFamily="34" charset="0"/>
+                  <a:latin typeface="BankGothic Lt BT" panose="020B0607020203060204" pitchFamily="34" charset="0"/>
                   <a:cs typeface="Leelawadee UI Semilight" panose="020B0402040204020203" pitchFamily="34" charset="-34"/>
                 </a:rPr>
                 <a:t>sample</a:t>
               </a:r>
-              <a:endParaRPr lang="de-DE" sz="1400" b="1" dirty="0">
+              <a:endParaRPr lang="de-DE" sz="1200" cap="all" dirty="0">
                 <a:solidFill>
                   <a:schemeClr val="tx1"/>
                 </a:solidFill>
-                <a:latin typeface="Candara" panose="020E0502030303020204" pitchFamily="34" charset="0"/>
+                <a:latin typeface="BankGothic Lt BT" panose="020B0607020203060204" pitchFamily="34" charset="0"/>
                 <a:cs typeface="Leelawadee UI Semilight" panose="020B0402040204020203" pitchFamily="34" charset="-34"/>
               </a:endParaRPr>
             </a:p>
@@ -3547,40 +3547,40 @@
             <a:p>
               <a:pPr algn="ctr"/>
               <a:r>
-                <a:rPr lang="de-DE" sz="1400" b="1" dirty="0" err="1" smtClean="0">
+                <a:rPr lang="de-DE" sz="1200" cap="all" dirty="0" err="1" smtClean="0">
                   <a:solidFill>
                     <a:schemeClr val="tx1"/>
                   </a:solidFill>
-                  <a:latin typeface="Candara" panose="020E0502030303020204" pitchFamily="34" charset="0"/>
+                  <a:latin typeface="BankGothic Lt BT" panose="020B0607020203060204" pitchFamily="34" charset="0"/>
                   <a:cs typeface="Leelawadee UI Semilight" panose="020B0402040204020203" pitchFamily="34" charset="-34"/>
                 </a:rPr>
                 <a:t>Knob</a:t>
               </a:r>
-              <a:endParaRPr lang="de-DE" sz="1400" b="1" dirty="0">
+              <a:endParaRPr lang="de-DE" sz="1200" cap="all" dirty="0">
                 <a:solidFill>
                   <a:schemeClr val="tx1"/>
                 </a:solidFill>
-                <a:latin typeface="Candara" panose="020E0502030303020204" pitchFamily="34" charset="0"/>
+                <a:latin typeface="BankGothic Lt BT" panose="020B0607020203060204" pitchFamily="34" charset="0"/>
                 <a:cs typeface="Leelawadee UI Semilight" panose="020B0402040204020203" pitchFamily="34" charset="-34"/>
               </a:endParaRPr>
             </a:p>
             <a:p>
               <a:pPr algn="ctr"/>
               <a:r>
-                <a:rPr lang="de-DE" sz="1400" b="1" dirty="0" err="1" smtClean="0">
+                <a:rPr lang="de-DE" sz="1200" cap="all" dirty="0" err="1" smtClean="0">
                   <a:solidFill>
                     <a:schemeClr val="tx1"/>
                   </a:solidFill>
-                  <a:latin typeface="Candara" panose="020E0502030303020204" pitchFamily="34" charset="0"/>
+                  <a:latin typeface="BankGothic Lt BT" panose="020B0607020203060204" pitchFamily="34" charset="0"/>
                   <a:cs typeface="Leelawadee UI Semilight" panose="020B0402040204020203" pitchFamily="34" charset="-34"/>
                 </a:rPr>
                 <a:t>control</a:t>
               </a:r>
-              <a:endParaRPr lang="de-DE" sz="1400" b="1" dirty="0">
+              <a:endParaRPr lang="de-DE" sz="1200" cap="all" dirty="0">
                 <a:solidFill>
                   <a:schemeClr val="tx1"/>
                 </a:solidFill>
-                <a:latin typeface="Candara" panose="020E0502030303020204" pitchFamily="34" charset="0"/>
+                <a:latin typeface="BankGothic Lt BT" panose="020B0607020203060204" pitchFamily="34" charset="0"/>
                 <a:cs typeface="Leelawadee UI Semilight" panose="020B0402040204020203" pitchFamily="34" charset="-34"/>
               </a:endParaRPr>
             </a:p>
@@ -3633,11 +3633,11 @@
             <a:p>
               <a:pPr algn="ctr"/>
               <a:r>
-                <a:rPr lang="de-DE" sz="1400" b="1" dirty="0" smtClean="0">
+                <a:rPr lang="de-DE" sz="1200" cap="all" dirty="0" smtClean="0">
                   <a:solidFill>
                     <a:schemeClr val="tx1"/>
                   </a:solidFill>
-                  <a:latin typeface="Candara" panose="020E0502030303020204" pitchFamily="34" charset="0"/>
+                  <a:latin typeface="BankGothic Lt BT" panose="020B0607020203060204" pitchFamily="34" charset="0"/>
                   <a:cs typeface="Leelawadee UI Semilight" panose="020B0402040204020203" pitchFamily="34" charset="-34"/>
                 </a:rPr>
                 <a:t>User</a:t>
@@ -3646,20 +3646,20 @@
             <a:p>
               <a:pPr algn="ctr"/>
               <a:r>
-                <a:rPr lang="de-DE" sz="1400" b="1" dirty="0" err="1" smtClean="0">
+                <a:rPr lang="de-DE" sz="1200" cap="all" dirty="0" err="1" smtClean="0">
                   <a:solidFill>
                     <a:schemeClr val="tx1"/>
                   </a:solidFill>
-                  <a:latin typeface="Candara" panose="020E0502030303020204" pitchFamily="34" charset="0"/>
+                  <a:latin typeface="BankGothic Lt BT" panose="020B0607020203060204" pitchFamily="34" charset="0"/>
                   <a:cs typeface="Leelawadee UI Semilight" panose="020B0402040204020203" pitchFamily="34" charset="-34"/>
                 </a:rPr>
                 <a:t>control</a:t>
               </a:r>
-              <a:endParaRPr lang="de-DE" sz="1400" b="1" dirty="0">
+              <a:endParaRPr lang="de-DE" sz="1200" cap="all" dirty="0">
                 <a:solidFill>
                   <a:schemeClr val="tx1"/>
                 </a:solidFill>
-                <a:latin typeface="Candara" panose="020E0502030303020204" pitchFamily="34" charset="0"/>
+                <a:latin typeface="BankGothic Lt BT" panose="020B0607020203060204" pitchFamily="34" charset="0"/>
                 <a:cs typeface="Leelawadee UI Semilight" panose="020B0402040204020203" pitchFamily="34" charset="-34"/>
               </a:endParaRPr>
             </a:p>
@@ -3712,40 +3712,40 @@
             <a:p>
               <a:pPr algn="ctr"/>
               <a:r>
-                <a:rPr lang="de-DE" sz="1400" b="1" dirty="0" err="1" smtClean="0">
+                <a:rPr lang="de-DE" sz="1200" cap="all" dirty="0" err="1" smtClean="0">
                   <a:solidFill>
                     <a:schemeClr val="tx1"/>
                   </a:solidFill>
-                  <a:latin typeface="Candara" panose="020E0502030303020204" pitchFamily="34" charset="0"/>
+                  <a:latin typeface="BankGothic Lt BT" panose="020B0607020203060204" pitchFamily="34" charset="0"/>
                   <a:cs typeface="Leelawadee UI Semilight" panose="020B0402040204020203" pitchFamily="34" charset="-34"/>
                 </a:rPr>
                 <a:t>Shoulder</a:t>
               </a:r>
-              <a:endParaRPr lang="de-DE" sz="1400" b="1" dirty="0" smtClean="0">
+              <a:endParaRPr lang="de-DE" sz="1200" cap="all" dirty="0" smtClean="0">
                 <a:solidFill>
                   <a:schemeClr val="tx1"/>
                 </a:solidFill>
-                <a:latin typeface="Candara" panose="020E0502030303020204" pitchFamily="34" charset="0"/>
+                <a:latin typeface="BankGothic Lt BT" panose="020B0607020203060204" pitchFamily="34" charset="0"/>
                 <a:cs typeface="Leelawadee UI Semilight" panose="020B0402040204020203" pitchFamily="34" charset="-34"/>
               </a:endParaRPr>
             </a:p>
             <a:p>
               <a:pPr algn="ctr"/>
               <a:r>
-                <a:rPr lang="de-DE" sz="1400" b="1" dirty="0" err="1" smtClean="0">
+                <a:rPr lang="de-DE" sz="1200" cap="all" dirty="0" err="1" smtClean="0">
                   <a:solidFill>
                     <a:schemeClr val="tx1"/>
                   </a:solidFill>
-                  <a:latin typeface="Candara" panose="020E0502030303020204" pitchFamily="34" charset="0"/>
+                  <a:latin typeface="BankGothic Lt BT" panose="020B0607020203060204" pitchFamily="34" charset="0"/>
                   <a:cs typeface="Leelawadee UI Semilight" panose="020B0402040204020203" pitchFamily="34" charset="-34"/>
                 </a:rPr>
                 <a:t>actuator</a:t>
               </a:r>
-              <a:endParaRPr lang="de-DE" sz="1400" b="1" dirty="0">
+              <a:endParaRPr lang="de-DE" sz="1200" cap="all" dirty="0">
                 <a:solidFill>
                   <a:schemeClr val="tx1"/>
                 </a:solidFill>
-                <a:latin typeface="Candara" panose="020E0502030303020204" pitchFamily="34" charset="0"/>
+                <a:latin typeface="BankGothic Lt BT" panose="020B0607020203060204" pitchFamily="34" charset="0"/>
                 <a:cs typeface="Leelawadee UI Semilight" panose="020B0402040204020203" pitchFamily="34" charset="-34"/>
               </a:endParaRPr>
             </a:p>
@@ -3798,40 +3798,40 @@
             <a:p>
               <a:pPr algn="ctr"/>
               <a:r>
-                <a:rPr lang="de-DE" sz="1400" b="1" dirty="0" err="1" smtClean="0">
+                <a:rPr lang="de-DE" sz="1200" cap="all" dirty="0" err="1" smtClean="0">
                   <a:solidFill>
                     <a:schemeClr val="tx1"/>
                   </a:solidFill>
-                  <a:latin typeface="Candara" panose="020E0502030303020204" pitchFamily="34" charset="0"/>
+                  <a:latin typeface="BankGothic Lt BT" panose="020B0607020203060204" pitchFamily="34" charset="0"/>
                   <a:cs typeface="Leelawadee UI Semilight" panose="020B0402040204020203" pitchFamily="34" charset="-34"/>
                 </a:rPr>
                 <a:t>Upperarm</a:t>
               </a:r>
-              <a:endParaRPr lang="de-DE" sz="1400" b="1" dirty="0" smtClean="0">
+              <a:endParaRPr lang="de-DE" sz="1200" cap="all" dirty="0" smtClean="0">
                 <a:solidFill>
                   <a:schemeClr val="tx1"/>
                 </a:solidFill>
-                <a:latin typeface="Candara" panose="020E0502030303020204" pitchFamily="34" charset="0"/>
+                <a:latin typeface="BankGothic Lt BT" panose="020B0607020203060204" pitchFamily="34" charset="0"/>
                 <a:cs typeface="Leelawadee UI Semilight" panose="020B0402040204020203" pitchFamily="34" charset="-34"/>
               </a:endParaRPr>
             </a:p>
             <a:p>
               <a:pPr algn="ctr"/>
               <a:r>
-                <a:rPr lang="de-DE" sz="1400" b="1" dirty="0" err="1" smtClean="0">
+                <a:rPr lang="de-DE" sz="1200" cap="all" dirty="0" err="1" smtClean="0">
                   <a:solidFill>
                     <a:schemeClr val="tx1"/>
                   </a:solidFill>
-                  <a:latin typeface="Candara" panose="020E0502030303020204" pitchFamily="34" charset="0"/>
+                  <a:latin typeface="BankGothic Lt BT" panose="020B0607020203060204" pitchFamily="34" charset="0"/>
                   <a:cs typeface="Leelawadee UI Semilight" panose="020B0402040204020203" pitchFamily="34" charset="-34"/>
                 </a:rPr>
                 <a:t>actuator</a:t>
               </a:r>
-              <a:endParaRPr lang="de-DE" sz="1400" b="1" dirty="0" smtClean="0">
+              <a:endParaRPr lang="de-DE" sz="1200" cap="all" dirty="0" smtClean="0">
                 <a:solidFill>
                   <a:schemeClr val="tx1"/>
                 </a:solidFill>
-                <a:latin typeface="Candara" panose="020E0502030303020204" pitchFamily="34" charset="0"/>
+                <a:latin typeface="BankGothic Lt BT" panose="020B0607020203060204" pitchFamily="34" charset="0"/>
                 <a:cs typeface="Leelawadee UI Semilight" panose="020B0402040204020203" pitchFamily="34" charset="-34"/>
               </a:endParaRPr>
             </a:p>
@@ -3884,40 +3884,40 @@
             <a:p>
               <a:pPr algn="ctr"/>
               <a:r>
-                <a:rPr lang="de-DE" sz="1400" b="1" dirty="0" err="1" smtClean="0">
+                <a:rPr lang="de-DE" sz="1200" cap="all" dirty="0" err="1" smtClean="0">
                   <a:solidFill>
                     <a:schemeClr val="tx1"/>
                   </a:solidFill>
-                  <a:latin typeface="Candara" panose="020E0502030303020204" pitchFamily="34" charset="0"/>
+                  <a:latin typeface="BankGothic Lt BT" panose="020B0607020203060204" pitchFamily="34" charset="0"/>
                   <a:cs typeface="Leelawadee UI Semilight" panose="020B0402040204020203" pitchFamily="34" charset="-34"/>
                 </a:rPr>
                 <a:t>Forearm</a:t>
               </a:r>
-              <a:endParaRPr lang="de-DE" sz="1400" b="1" dirty="0" smtClean="0">
+              <a:endParaRPr lang="de-DE" sz="1200" cap="all" dirty="0" smtClean="0">
                 <a:solidFill>
                   <a:schemeClr val="tx1"/>
                 </a:solidFill>
-                <a:latin typeface="Candara" panose="020E0502030303020204" pitchFamily="34" charset="0"/>
+                <a:latin typeface="BankGothic Lt BT" panose="020B0607020203060204" pitchFamily="34" charset="0"/>
                 <a:cs typeface="Leelawadee UI Semilight" panose="020B0402040204020203" pitchFamily="34" charset="-34"/>
               </a:endParaRPr>
             </a:p>
             <a:p>
               <a:pPr algn="ctr"/>
               <a:r>
-                <a:rPr lang="de-DE" sz="1400" b="1" dirty="0" err="1" smtClean="0">
+                <a:rPr lang="de-DE" sz="1200" cap="all" dirty="0" err="1" smtClean="0">
                   <a:solidFill>
                     <a:schemeClr val="tx1"/>
                   </a:solidFill>
-                  <a:latin typeface="Candara" panose="020E0502030303020204" pitchFamily="34" charset="0"/>
+                  <a:latin typeface="BankGothic Lt BT" panose="020B0607020203060204" pitchFamily="34" charset="0"/>
                   <a:cs typeface="Leelawadee UI Semilight" panose="020B0402040204020203" pitchFamily="34" charset="-34"/>
                 </a:rPr>
                 <a:t>actuator</a:t>
               </a:r>
-              <a:endParaRPr lang="de-DE" sz="1400" b="1" dirty="0" smtClean="0">
+              <a:endParaRPr lang="de-DE" sz="1200" cap="all" dirty="0" smtClean="0">
                 <a:solidFill>
                   <a:schemeClr val="tx1"/>
                 </a:solidFill>
-                <a:latin typeface="Candara" panose="020E0502030303020204" pitchFamily="34" charset="0"/>
+                <a:latin typeface="BankGothic Lt BT" panose="020B0607020203060204" pitchFamily="34" charset="0"/>
                 <a:cs typeface="Leelawadee UI Semilight" panose="020B0402040204020203" pitchFamily="34" charset="-34"/>
               </a:endParaRPr>
             </a:p>
@@ -3970,40 +3970,40 @@
             <a:p>
               <a:pPr algn="ctr"/>
               <a:r>
-                <a:rPr lang="de-DE" sz="1400" b="1" dirty="0" err="1" smtClean="0">
+                <a:rPr lang="de-DE" sz="1200" cap="all" dirty="0" err="1" smtClean="0">
                   <a:solidFill>
                     <a:schemeClr val="tx1"/>
                   </a:solidFill>
-                  <a:latin typeface="Candara" panose="020E0502030303020204" pitchFamily="34" charset="0"/>
+                  <a:latin typeface="BankGothic Lt BT" panose="020B0607020203060204" pitchFamily="34" charset="0"/>
                   <a:cs typeface="Leelawadee UI Semilight" panose="020B0402040204020203" pitchFamily="34" charset="-34"/>
                 </a:rPr>
                 <a:t>Ellbow</a:t>
               </a:r>
-              <a:endParaRPr lang="de-DE" sz="1400" b="1" dirty="0" smtClean="0">
+              <a:endParaRPr lang="de-DE" sz="1200" cap="all" dirty="0" smtClean="0">
                 <a:solidFill>
                   <a:schemeClr val="tx1"/>
                 </a:solidFill>
-                <a:latin typeface="Candara" panose="020E0502030303020204" pitchFamily="34" charset="0"/>
+                <a:latin typeface="BankGothic Lt BT" panose="020B0607020203060204" pitchFamily="34" charset="0"/>
                 <a:cs typeface="Leelawadee UI Semilight" panose="020B0402040204020203" pitchFamily="34" charset="-34"/>
               </a:endParaRPr>
             </a:p>
             <a:p>
               <a:pPr algn="ctr"/>
               <a:r>
-                <a:rPr lang="de-DE" sz="1400" b="1" dirty="0" err="1" smtClean="0">
+                <a:rPr lang="de-DE" sz="1200" cap="all" dirty="0" err="1" smtClean="0">
                   <a:solidFill>
                     <a:schemeClr val="tx1"/>
                   </a:solidFill>
-                  <a:latin typeface="Candara" panose="020E0502030303020204" pitchFamily="34" charset="0"/>
+                  <a:latin typeface="BankGothic Lt BT" panose="020B0607020203060204" pitchFamily="34" charset="0"/>
                   <a:cs typeface="Leelawadee UI Semilight" panose="020B0402040204020203" pitchFamily="34" charset="-34"/>
                 </a:rPr>
                 <a:t>actuator</a:t>
               </a:r>
-              <a:endParaRPr lang="de-DE" sz="1400" b="1" dirty="0" smtClean="0">
+              <a:endParaRPr lang="de-DE" sz="1200" cap="all" dirty="0" smtClean="0">
                 <a:solidFill>
                   <a:schemeClr val="tx1"/>
                 </a:solidFill>
-                <a:latin typeface="Candara" panose="020E0502030303020204" pitchFamily="34" charset="0"/>
+                <a:latin typeface="BankGothic Lt BT" panose="020B0607020203060204" pitchFamily="34" charset="0"/>
                 <a:cs typeface="Leelawadee UI Semilight" panose="020B0402040204020203" pitchFamily="34" charset="-34"/>
               </a:endParaRPr>
             </a:p>
@@ -4056,40 +4056,40 @@
             <a:p>
               <a:pPr algn="ctr"/>
               <a:r>
-                <a:rPr lang="de-DE" sz="1400" b="1" dirty="0" err="1" smtClean="0">
+                <a:rPr lang="de-DE" sz="1200" cap="all" dirty="0" err="1" smtClean="0">
                   <a:solidFill>
                     <a:schemeClr val="tx1"/>
                   </a:solidFill>
-                  <a:latin typeface="Candara" panose="020E0502030303020204" pitchFamily="34" charset="0"/>
+                  <a:latin typeface="BankGothic Lt BT" panose="020B0607020203060204" pitchFamily="34" charset="0"/>
                   <a:cs typeface="Leelawadee UI Semilight" panose="020B0402040204020203" pitchFamily="34" charset="-34"/>
                 </a:rPr>
                 <a:t>Wrist</a:t>
               </a:r>
-              <a:endParaRPr lang="de-DE" sz="1400" b="1" dirty="0" smtClean="0">
+              <a:endParaRPr lang="de-DE" sz="1200" cap="all" dirty="0" smtClean="0">
                 <a:solidFill>
                   <a:schemeClr val="tx1"/>
                 </a:solidFill>
-                <a:latin typeface="Candara" panose="020E0502030303020204" pitchFamily="34" charset="0"/>
+                <a:latin typeface="BankGothic Lt BT" panose="020B0607020203060204" pitchFamily="34" charset="0"/>
                 <a:cs typeface="Leelawadee UI Semilight" panose="020B0402040204020203" pitchFamily="34" charset="-34"/>
               </a:endParaRPr>
             </a:p>
             <a:p>
               <a:pPr algn="ctr"/>
               <a:r>
-                <a:rPr lang="de-DE" sz="1400" b="1" dirty="0" err="1" smtClean="0">
+                <a:rPr lang="de-DE" sz="1200" cap="all" dirty="0" err="1" smtClean="0">
                   <a:solidFill>
                     <a:schemeClr val="tx1"/>
                   </a:solidFill>
-                  <a:latin typeface="Candara" panose="020E0502030303020204" pitchFamily="34" charset="0"/>
+                  <a:latin typeface="BankGothic Lt BT" panose="020B0607020203060204" pitchFamily="34" charset="0"/>
                   <a:cs typeface="Leelawadee UI Semilight" panose="020B0402040204020203" pitchFamily="34" charset="-34"/>
                 </a:rPr>
                 <a:t>actuator</a:t>
               </a:r>
-              <a:endParaRPr lang="de-DE" sz="1400" b="1" dirty="0" smtClean="0">
+              <a:endParaRPr lang="de-DE" sz="1200" cap="all" dirty="0" smtClean="0">
                 <a:solidFill>
                   <a:schemeClr val="tx1"/>
                 </a:solidFill>
-                <a:latin typeface="Candara" panose="020E0502030303020204" pitchFamily="34" charset="0"/>
+                <a:latin typeface="BankGothic Lt BT" panose="020B0607020203060204" pitchFamily="34" charset="0"/>
                 <a:cs typeface="Leelawadee UI Semilight" panose="020B0402040204020203" pitchFamily="34" charset="-34"/>
               </a:endParaRPr>
             </a:p>
@@ -4142,11 +4142,11 @@
             <a:p>
               <a:pPr algn="ctr"/>
               <a:r>
-                <a:rPr lang="de-DE" sz="1400" b="1" dirty="0" smtClean="0">
+                <a:rPr lang="de-DE" sz="1200" cap="all" dirty="0" smtClean="0">
                   <a:solidFill>
                     <a:schemeClr val="tx1"/>
                   </a:solidFill>
-                  <a:latin typeface="Candara" panose="020E0502030303020204" pitchFamily="34" charset="0"/>
+                  <a:latin typeface="BankGothic Lt BT" panose="020B0607020203060204" pitchFamily="34" charset="0"/>
                   <a:cs typeface="Leelawadee UI Semilight" panose="020B0402040204020203" pitchFamily="34" charset="-34"/>
                 </a:rPr>
                 <a:t>Hand</a:t>
@@ -4155,20 +4155,20 @@
             <a:p>
               <a:pPr algn="ctr"/>
               <a:r>
-                <a:rPr lang="de-DE" sz="1400" b="1" dirty="0" err="1" smtClean="0">
+                <a:rPr lang="de-DE" sz="1200" cap="all" dirty="0" err="1" smtClean="0">
                   <a:solidFill>
                     <a:schemeClr val="tx1"/>
                   </a:solidFill>
-                  <a:latin typeface="Candara" panose="020E0502030303020204" pitchFamily="34" charset="0"/>
+                  <a:latin typeface="BankGothic Lt BT" panose="020B0607020203060204" pitchFamily="34" charset="0"/>
                   <a:cs typeface="Leelawadee UI Semilight" panose="020B0402040204020203" pitchFamily="34" charset="-34"/>
                 </a:rPr>
                 <a:t>actuator</a:t>
               </a:r>
-              <a:endParaRPr lang="de-DE" sz="1400" b="1" dirty="0">
+              <a:endParaRPr lang="de-DE" sz="1200" cap="all" dirty="0">
                 <a:solidFill>
                   <a:schemeClr val="tx1"/>
                 </a:solidFill>
-                <a:latin typeface="Candara" panose="020E0502030303020204" pitchFamily="34" charset="0"/>
+                <a:latin typeface="BankGothic Lt BT" panose="020B0607020203060204" pitchFamily="34" charset="0"/>
                 <a:cs typeface="Leelawadee UI Semilight" panose="020B0402040204020203" pitchFamily="34" charset="-34"/>
               </a:endParaRPr>
             </a:p>
@@ -4221,11 +4221,11 @@
             <a:p>
               <a:pPr algn="ctr"/>
               <a:r>
-                <a:rPr lang="de-DE" sz="1400" b="1" dirty="0" smtClean="0">
+                <a:rPr lang="de-DE" sz="1200" cap="all" dirty="0" smtClean="0">
                   <a:solidFill>
                     <a:schemeClr val="tx1"/>
                   </a:solidFill>
-                  <a:latin typeface="Candara" panose="020E0502030303020204" pitchFamily="34" charset="0"/>
+                  <a:latin typeface="BankGothic Lt BT" panose="020B0607020203060204" pitchFamily="34" charset="0"/>
                   <a:cs typeface="Leelawadee UI Semilight" panose="020B0402040204020203" pitchFamily="34" charset="-34"/>
                 </a:rPr>
                 <a:t>Finger</a:t>
@@ -4234,20 +4234,20 @@
             <a:p>
               <a:pPr algn="ctr"/>
               <a:r>
-                <a:rPr lang="de-DE" sz="1400" b="1" dirty="0" err="1" smtClean="0">
+                <a:rPr lang="de-DE" sz="1200" cap="all" dirty="0" err="1" smtClean="0">
                   <a:solidFill>
                     <a:schemeClr val="tx1"/>
                   </a:solidFill>
-                  <a:latin typeface="Candara" panose="020E0502030303020204" pitchFamily="34" charset="0"/>
+                  <a:latin typeface="BankGothic Lt BT" panose="020B0607020203060204" pitchFamily="34" charset="0"/>
                   <a:cs typeface="Leelawadee UI Semilight" panose="020B0402040204020203" pitchFamily="34" charset="-34"/>
                 </a:rPr>
                 <a:t>actuator</a:t>
               </a:r>
-              <a:endParaRPr lang="de-DE" sz="1400" b="1" dirty="0">
+              <a:endParaRPr lang="de-DE" sz="1200" cap="all" dirty="0">
                 <a:solidFill>
                   <a:schemeClr val="tx1"/>
                 </a:solidFill>
-                <a:latin typeface="Candara" panose="020E0502030303020204" pitchFamily="34" charset="0"/>
+                <a:latin typeface="BankGothic Lt BT" panose="020B0607020203060204" pitchFamily="34" charset="0"/>
                 <a:cs typeface="Leelawadee UI Semilight" panose="020B0402040204020203" pitchFamily="34" charset="-34"/>
               </a:endParaRPr>
             </a:p>
@@ -4300,30 +4300,30 @@
             <a:p>
               <a:pPr algn="ctr"/>
               <a:r>
-                <a:rPr lang="de-DE" sz="1400" b="1" dirty="0" err="1" smtClean="0">
+                <a:rPr lang="de-DE" sz="1200" cap="all" dirty="0" err="1" smtClean="0">
                   <a:solidFill>
                     <a:schemeClr val="tx1"/>
                   </a:solidFill>
-                  <a:latin typeface="Candara" panose="020E0502030303020204" pitchFamily="34" charset="0"/>
+                  <a:latin typeface="BankGothic Lt BT" panose="020B0607020203060204" pitchFamily="34" charset="0"/>
                   <a:cs typeface="Leelawadee UI Semilight" panose="020B0402040204020203" pitchFamily="34" charset="-34"/>
                 </a:rPr>
                 <a:t>Broken</a:t>
               </a:r>
               <a:r>
-                <a:rPr lang="de-DE" sz="1400" b="1" dirty="0" smtClean="0">
+                <a:rPr lang="de-DE" sz="1200" cap="all" dirty="0" smtClean="0">
                   <a:solidFill>
                     <a:schemeClr val="tx1"/>
                   </a:solidFill>
-                  <a:latin typeface="Candara" panose="020E0502030303020204" pitchFamily="34" charset="0"/>
+                  <a:latin typeface="BankGothic Lt BT" panose="020B0607020203060204" pitchFamily="34" charset="0"/>
                   <a:cs typeface="Leelawadee UI Semilight" panose="020B0402040204020203" pitchFamily="34" charset="-34"/>
                 </a:rPr>
                 <a:t> light</a:t>
               </a:r>
-              <a:endParaRPr lang="de-DE" sz="1400" b="1" dirty="0">
+              <a:endParaRPr lang="de-DE" sz="1200" cap="all" dirty="0">
                 <a:solidFill>
                   <a:schemeClr val="tx1"/>
                 </a:solidFill>
-                <a:latin typeface="Candara" panose="020E0502030303020204" pitchFamily="34" charset="0"/>
+                <a:latin typeface="BankGothic Lt BT" panose="020B0607020203060204" pitchFamily="34" charset="0"/>
                 <a:cs typeface="Leelawadee UI Semilight" panose="020B0402040204020203" pitchFamily="34" charset="-34"/>
               </a:endParaRPr>
             </a:p>

</xml_diff>

<commit_message>
added power supply to the housing
</commit_message>
<xml_diff>
--- a/cad/Walter-Lettering.pptx
+++ b/cad/Walter-Lettering.pptx
@@ -243,7 +243,7 @@
           <a:p>
             <a:fld id="{BD70DBB8-8826-40D8-8146-11A515A3C116}" type="datetimeFigureOut">
               <a:rPr lang="de-DE" smtClean="0"/>
-              <a:t>08.12.2016</a:t>
+              <a:t>13.12.2016</a:t>
             </a:fld>
             <a:endParaRPr lang="de-DE"/>
           </a:p>
@@ -413,7 +413,7 @@
           <a:p>
             <a:fld id="{BD70DBB8-8826-40D8-8146-11A515A3C116}" type="datetimeFigureOut">
               <a:rPr lang="de-DE" smtClean="0"/>
-              <a:t>08.12.2016</a:t>
+              <a:t>13.12.2016</a:t>
             </a:fld>
             <a:endParaRPr lang="de-DE"/>
           </a:p>
@@ -593,7 +593,7 @@
           <a:p>
             <a:fld id="{BD70DBB8-8826-40D8-8146-11A515A3C116}" type="datetimeFigureOut">
               <a:rPr lang="de-DE" smtClean="0"/>
-              <a:t>08.12.2016</a:t>
+              <a:t>13.12.2016</a:t>
             </a:fld>
             <a:endParaRPr lang="de-DE"/>
           </a:p>
@@ -763,7 +763,7 @@
           <a:p>
             <a:fld id="{BD70DBB8-8826-40D8-8146-11A515A3C116}" type="datetimeFigureOut">
               <a:rPr lang="de-DE" smtClean="0"/>
-              <a:t>08.12.2016</a:t>
+              <a:t>13.12.2016</a:t>
             </a:fld>
             <a:endParaRPr lang="de-DE"/>
           </a:p>
@@ -1007,7 +1007,7 @@
           <a:p>
             <a:fld id="{BD70DBB8-8826-40D8-8146-11A515A3C116}" type="datetimeFigureOut">
               <a:rPr lang="de-DE" smtClean="0"/>
-              <a:t>08.12.2016</a:t>
+              <a:t>13.12.2016</a:t>
             </a:fld>
             <a:endParaRPr lang="de-DE"/>
           </a:p>
@@ -1239,7 +1239,7 @@
           <a:p>
             <a:fld id="{BD70DBB8-8826-40D8-8146-11A515A3C116}" type="datetimeFigureOut">
               <a:rPr lang="de-DE" smtClean="0"/>
-              <a:t>08.12.2016</a:t>
+              <a:t>13.12.2016</a:t>
             </a:fld>
             <a:endParaRPr lang="de-DE"/>
           </a:p>
@@ -1606,7 +1606,7 @@
           <a:p>
             <a:fld id="{BD70DBB8-8826-40D8-8146-11A515A3C116}" type="datetimeFigureOut">
               <a:rPr lang="de-DE" smtClean="0"/>
-              <a:t>08.12.2016</a:t>
+              <a:t>13.12.2016</a:t>
             </a:fld>
             <a:endParaRPr lang="de-DE"/>
           </a:p>
@@ -1724,7 +1724,7 @@
           <a:p>
             <a:fld id="{BD70DBB8-8826-40D8-8146-11A515A3C116}" type="datetimeFigureOut">
               <a:rPr lang="de-DE" smtClean="0"/>
-              <a:t>08.12.2016</a:t>
+              <a:t>13.12.2016</a:t>
             </a:fld>
             <a:endParaRPr lang="de-DE"/>
           </a:p>
@@ -1819,7 +1819,7 @@
           <a:p>
             <a:fld id="{BD70DBB8-8826-40D8-8146-11A515A3C116}" type="datetimeFigureOut">
               <a:rPr lang="de-DE" smtClean="0"/>
-              <a:t>08.12.2016</a:t>
+              <a:t>13.12.2016</a:t>
             </a:fld>
             <a:endParaRPr lang="de-DE"/>
           </a:p>
@@ -2096,7 +2096,7 @@
           <a:p>
             <a:fld id="{BD70DBB8-8826-40D8-8146-11A515A3C116}" type="datetimeFigureOut">
               <a:rPr lang="de-DE" smtClean="0"/>
-              <a:t>08.12.2016</a:t>
+              <a:t>13.12.2016</a:t>
             </a:fld>
             <a:endParaRPr lang="de-DE"/>
           </a:p>
@@ -2353,7 +2353,7 @@
           <a:p>
             <a:fld id="{BD70DBB8-8826-40D8-8146-11A515A3C116}" type="datetimeFigureOut">
               <a:rPr lang="de-DE" smtClean="0"/>
-              <a:t>08.12.2016</a:t>
+              <a:t>13.12.2016</a:t>
             </a:fld>
             <a:endParaRPr lang="de-DE"/>
           </a:p>
@@ -2566,7 +2566,7 @@
           <a:p>
             <a:fld id="{BD70DBB8-8826-40D8-8146-11A515A3C116}" type="datetimeFigureOut">
               <a:rPr lang="de-DE" smtClean="0"/>
-              <a:t>08.12.2016</a:t>
+              <a:t>13.12.2016</a:t>
             </a:fld>
             <a:endParaRPr lang="de-DE"/>
           </a:p>
@@ -3024,7 +3024,7 @@
           <a:lstStyle/>
           <a:p>
             <a:pPr algn="ctr"/>
-            <a:endParaRPr lang="de-DE" sz="1400" spc="100">
+            <a:endParaRPr lang="en-GB" sz="1400" b="1" spc="100" dirty="0">
               <a:solidFill>
                 <a:schemeClr val="tx1"/>
               </a:solidFill>
@@ -3095,7 +3095,7 @@
             <a:p>
               <a:pPr algn="ctr"/>
               <a:r>
-                <a:rPr lang="de-DE" sz="1200" cap="all" dirty="0" err="1" smtClean="0">
+                <a:rPr lang="en-GB" sz="1200" b="1" cap="all" dirty="0" smtClean="0">
                   <a:solidFill>
                     <a:schemeClr val="tx1"/>
                   </a:solidFill>
@@ -3104,7 +3104,7 @@
                 </a:rPr>
                 <a:t>Heartbeat</a:t>
               </a:r>
-              <a:endParaRPr lang="de-DE" sz="1200" cap="all" dirty="0">
+              <a:endParaRPr lang="en-GB" sz="1200" b="1" cap="all" dirty="0">
                 <a:solidFill>
                   <a:schemeClr val="tx1"/>
                 </a:solidFill>
@@ -3161,7 +3161,7 @@
             <a:p>
               <a:pPr algn="ctr"/>
               <a:r>
-                <a:rPr lang="de-DE" sz="1200" cap="all" dirty="0" smtClean="0">
+                <a:rPr lang="en-GB" sz="1200" b="1" cap="all" dirty="0" smtClean="0">
                   <a:solidFill>
                     <a:schemeClr val="tx1"/>
                   </a:solidFill>
@@ -3170,7 +3170,7 @@
                 </a:rPr>
                 <a:t>Setup</a:t>
               </a:r>
-              <a:endParaRPr lang="de-DE" sz="1200" cap="all" dirty="0" smtClean="0">
+              <a:endParaRPr lang="en-GB" sz="1200" b="1" cap="all" dirty="0" smtClean="0">
                 <a:solidFill>
                   <a:schemeClr val="tx1"/>
                 </a:solidFill>
@@ -3227,7 +3227,7 @@
             <a:p>
               <a:pPr algn="ctr"/>
               <a:r>
-                <a:rPr lang="de-DE" sz="1200" cap="all" dirty="0" smtClean="0">
+                <a:rPr lang="en-GB" sz="1200" b="1" cap="all" dirty="0" smtClean="0">
                   <a:solidFill>
                     <a:schemeClr val="tx1"/>
                   </a:solidFill>
@@ -3240,7 +3240,7 @@
             <a:p>
               <a:pPr algn="ctr"/>
               <a:r>
-                <a:rPr lang="de-DE" sz="1200" cap="all" dirty="0" smtClean="0">
+                <a:rPr lang="en-GB" sz="1200" b="1" cap="all" dirty="0" smtClean="0">
                   <a:solidFill>
                     <a:schemeClr val="tx1"/>
                   </a:solidFill>
@@ -3249,7 +3249,7 @@
                 </a:rPr>
                 <a:t>On</a:t>
               </a:r>
-              <a:endParaRPr lang="de-DE" sz="1200" cap="all" dirty="0" smtClean="0">
+              <a:endParaRPr lang="en-GB" sz="1200" b="1" cap="all" dirty="0" smtClean="0">
                 <a:solidFill>
                   <a:schemeClr val="tx1"/>
                 </a:solidFill>
@@ -3306,26 +3306,16 @@
             <a:p>
               <a:pPr algn="ctr"/>
               <a:r>
-                <a:rPr lang="de-DE" sz="1200" cap="all" dirty="0" smtClean="0">
+                <a:rPr lang="en-GB" sz="1200" b="1" cap="all" dirty="0" smtClean="0">
                   <a:solidFill>
                     <a:schemeClr val="tx1"/>
                   </a:solidFill>
                   <a:latin typeface="BankGothic Lt BT" panose="020B0607020203060204" pitchFamily="34" charset="0"/>
                   <a:cs typeface="Leelawadee UI Semilight" panose="020B0402040204020203" pitchFamily="34" charset="-34"/>
                 </a:rPr>
-                <a:t>Enable</a:t>
+                <a:t>Enabled</a:t>
               </a:r>
-              <a:r>
-                <a:rPr lang="de-DE" sz="1200" cap="all" dirty="0">
-                  <a:solidFill>
-                    <a:schemeClr val="tx1"/>
-                  </a:solidFill>
-                  <a:latin typeface="BankGothic Lt BT" panose="020B0607020203060204" pitchFamily="34" charset="0"/>
-                  <a:cs typeface="Leelawadee UI Semilight" panose="020B0402040204020203" pitchFamily="34" charset="-34"/>
-                </a:rPr>
-                <a:t>d</a:t>
-              </a:r>
-              <a:endParaRPr lang="de-DE" sz="1200" cap="all" dirty="0" smtClean="0">
+              <a:endParaRPr lang="en-GB" sz="1200" b="1" cap="all" dirty="0" smtClean="0">
                 <a:solidFill>
                   <a:schemeClr val="tx1"/>
                 </a:solidFill>
@@ -3382,7 +3372,7 @@
             <a:p>
               <a:pPr algn="ctr"/>
               <a:r>
-                <a:rPr lang="de-DE" sz="1200" cap="all" dirty="0" err="1" smtClean="0">
+                <a:rPr lang="en-GB" sz="1200" b="1" cap="all" dirty="0" smtClean="0">
                   <a:solidFill>
                     <a:schemeClr val="tx1"/>
                   </a:solidFill>
@@ -3391,27 +3381,20 @@
                 </a:rPr>
                 <a:t>Trajectory</a:t>
               </a:r>
-              <a:endParaRPr lang="de-DE" sz="1200" cap="all" dirty="0" smtClean="0">
-                <a:solidFill>
-                  <a:schemeClr val="tx1"/>
-                </a:solidFill>
-                <a:latin typeface="BankGothic Lt BT" panose="020B0607020203060204" pitchFamily="34" charset="0"/>
-                <a:cs typeface="Leelawadee UI Semilight" panose="020B0402040204020203" pitchFamily="34" charset="-34"/>
-              </a:endParaRPr>
             </a:p>
             <a:p>
               <a:pPr algn="ctr"/>
               <a:r>
-                <a:rPr lang="de-DE" sz="1200" cap="all" dirty="0" err="1" smtClean="0">
+                <a:rPr lang="en-GB" sz="1200" b="1" cap="all" dirty="0" smtClean="0">
                   <a:solidFill>
                     <a:schemeClr val="tx1"/>
                   </a:solidFill>
                   <a:latin typeface="BankGothic Lt BT" panose="020B0607020203060204" pitchFamily="34" charset="0"/>
                   <a:cs typeface="Leelawadee UI Semilight" panose="020B0402040204020203" pitchFamily="34" charset="-34"/>
                 </a:rPr>
-                <a:t>control</a:t>
+                <a:t>MODE</a:t>
               </a:r>
-              <a:endParaRPr lang="de-DE" sz="1200" cap="all" dirty="0" smtClean="0">
+              <a:endParaRPr lang="en-GB" sz="1200" b="1" cap="all" dirty="0" smtClean="0">
                 <a:solidFill>
                   <a:schemeClr val="tx1"/>
                 </a:solidFill>
@@ -3468,7 +3451,7 @@
             <a:p>
               <a:pPr algn="ctr"/>
               <a:r>
-                <a:rPr lang="de-DE" sz="1200" cap="all" dirty="0" smtClean="0">
+                <a:rPr lang="en-GB" sz="1200" b="1" cap="all" dirty="0" smtClean="0">
                   <a:solidFill>
                     <a:schemeClr val="tx1"/>
                   </a:solidFill>
@@ -3481,7 +3464,7 @@
             <a:p>
               <a:pPr algn="ctr"/>
               <a:r>
-                <a:rPr lang="de-DE" sz="1200" cap="all" dirty="0" smtClean="0">
+                <a:rPr lang="en-GB" sz="1200" b="1" cap="all" dirty="0" smtClean="0">
                   <a:solidFill>
                     <a:schemeClr val="tx1"/>
                   </a:solidFill>
@@ -3490,7 +3473,7 @@
                 </a:rPr>
                 <a:t>sample</a:t>
               </a:r>
-              <a:endParaRPr lang="de-DE" sz="1200" cap="all" dirty="0">
+              <a:endParaRPr lang="en-GB" sz="1200" b="1" cap="all" dirty="0">
                 <a:solidFill>
                   <a:schemeClr val="tx1"/>
                 </a:solidFill>
@@ -3547,36 +3530,29 @@
             <a:p>
               <a:pPr algn="ctr"/>
               <a:r>
-                <a:rPr lang="de-DE" sz="1200" cap="all" dirty="0" err="1" smtClean="0">
+                <a:rPr lang="en-GB" sz="1200" b="1" cap="all" dirty="0" smtClean="0">
                   <a:solidFill>
                     <a:schemeClr val="tx1"/>
                   </a:solidFill>
                   <a:latin typeface="BankGothic Lt BT" panose="020B0607020203060204" pitchFamily="34" charset="0"/>
                   <a:cs typeface="Leelawadee UI Semilight" panose="020B0402040204020203" pitchFamily="34" charset="-34"/>
                 </a:rPr>
-                <a:t>Knob</a:t>
+                <a:t>Control</a:t>
               </a:r>
-              <a:endParaRPr lang="de-DE" sz="1200" cap="all" dirty="0">
-                <a:solidFill>
-                  <a:schemeClr val="tx1"/>
-                </a:solidFill>
-                <a:latin typeface="BankGothic Lt BT" panose="020B0607020203060204" pitchFamily="34" charset="0"/>
-                <a:cs typeface="Leelawadee UI Semilight" panose="020B0402040204020203" pitchFamily="34" charset="-34"/>
-              </a:endParaRPr>
             </a:p>
             <a:p>
               <a:pPr algn="ctr"/>
               <a:r>
-                <a:rPr lang="de-DE" sz="1200" cap="all" dirty="0" err="1" smtClean="0">
+                <a:rPr lang="en-GB" sz="1200" b="1" cap="all" dirty="0" smtClean="0">
                   <a:solidFill>
                     <a:schemeClr val="tx1"/>
                   </a:solidFill>
                   <a:latin typeface="BankGothic Lt BT" panose="020B0607020203060204" pitchFamily="34" charset="0"/>
                   <a:cs typeface="Leelawadee UI Semilight" panose="020B0402040204020203" pitchFamily="34" charset="-34"/>
                 </a:rPr>
-                <a:t>control</a:t>
+                <a:t>MODE</a:t>
               </a:r>
-              <a:endParaRPr lang="de-DE" sz="1200" cap="all" dirty="0">
+              <a:endParaRPr lang="en-GB" sz="1200" b="1" cap="all" dirty="0">
                 <a:solidFill>
                   <a:schemeClr val="tx1"/>
                 </a:solidFill>
@@ -3633,29 +3609,29 @@
             <a:p>
               <a:pPr algn="ctr"/>
               <a:r>
-                <a:rPr lang="de-DE" sz="1200" cap="all" dirty="0" smtClean="0">
+                <a:rPr lang="en-GB" sz="1200" b="1" cap="all" dirty="0" smtClean="0">
                   <a:solidFill>
                     <a:schemeClr val="tx1"/>
                   </a:solidFill>
                   <a:latin typeface="BankGothic Lt BT" panose="020B0607020203060204" pitchFamily="34" charset="0"/>
                   <a:cs typeface="Leelawadee UI Semilight" panose="020B0402040204020203" pitchFamily="34" charset="-34"/>
                 </a:rPr>
-                <a:t>User</a:t>
+                <a:t>AMOK </a:t>
               </a:r>
             </a:p>
             <a:p>
               <a:pPr algn="ctr"/>
               <a:r>
-                <a:rPr lang="de-DE" sz="1200" cap="all" dirty="0" err="1" smtClean="0">
+                <a:rPr lang="en-GB" sz="1200" b="1" cap="all" dirty="0" smtClean="0">
                   <a:solidFill>
                     <a:schemeClr val="tx1"/>
                   </a:solidFill>
                   <a:latin typeface="BankGothic Lt BT" panose="020B0607020203060204" pitchFamily="34" charset="0"/>
                   <a:cs typeface="Leelawadee UI Semilight" panose="020B0402040204020203" pitchFamily="34" charset="-34"/>
                 </a:rPr>
-                <a:t>control</a:t>
+                <a:t>Mode</a:t>
               </a:r>
-              <a:endParaRPr lang="de-DE" sz="1200" cap="all" dirty="0">
+              <a:endParaRPr lang="en-GB" sz="1200" b="1" cap="all" dirty="0">
                 <a:solidFill>
                   <a:schemeClr val="tx1"/>
                 </a:solidFill>
@@ -3712,7 +3688,7 @@
             <a:p>
               <a:pPr algn="ctr"/>
               <a:r>
-                <a:rPr lang="de-DE" sz="1200" cap="all" dirty="0" err="1" smtClean="0">
+                <a:rPr lang="en-GB" sz="1200" b="1" cap="all" dirty="0" smtClean="0">
                   <a:solidFill>
                     <a:schemeClr val="tx1"/>
                   </a:solidFill>
@@ -3721,27 +3697,7 @@
                 </a:rPr>
                 <a:t>Shoulder</a:t>
               </a:r>
-              <a:endParaRPr lang="de-DE" sz="1200" cap="all" dirty="0" smtClean="0">
-                <a:solidFill>
-                  <a:schemeClr val="tx1"/>
-                </a:solidFill>
-                <a:latin typeface="BankGothic Lt BT" panose="020B0607020203060204" pitchFamily="34" charset="0"/>
-                <a:cs typeface="Leelawadee UI Semilight" panose="020B0402040204020203" pitchFamily="34" charset="-34"/>
-              </a:endParaRPr>
-            </a:p>
-            <a:p>
-              <a:pPr algn="ctr"/>
-              <a:r>
-                <a:rPr lang="de-DE" sz="1200" cap="all" dirty="0" err="1" smtClean="0">
-                  <a:solidFill>
-                    <a:schemeClr val="tx1"/>
-                  </a:solidFill>
-                  <a:latin typeface="BankGothic Lt BT" panose="020B0607020203060204" pitchFamily="34" charset="0"/>
-                  <a:cs typeface="Leelawadee UI Semilight" panose="020B0402040204020203" pitchFamily="34" charset="-34"/>
-                </a:rPr>
-                <a:t>actuator</a:t>
-              </a:r>
-              <a:endParaRPr lang="de-DE" sz="1200" cap="all" dirty="0">
+              <a:endParaRPr lang="en-GB" sz="1200" b="1" cap="all" dirty="0" smtClean="0">
                 <a:solidFill>
                   <a:schemeClr val="tx1"/>
                 </a:solidFill>
@@ -3798,36 +3754,16 @@
             <a:p>
               <a:pPr algn="ctr"/>
               <a:r>
-                <a:rPr lang="de-DE" sz="1200" cap="all" dirty="0" err="1" smtClean="0">
+                <a:rPr lang="en-GB" sz="1200" b="1" cap="all" dirty="0" smtClean="0">
                   <a:solidFill>
                     <a:schemeClr val="tx1"/>
                   </a:solidFill>
                   <a:latin typeface="BankGothic Lt BT" panose="020B0607020203060204" pitchFamily="34" charset="0"/>
                   <a:cs typeface="Leelawadee UI Semilight" panose="020B0402040204020203" pitchFamily="34" charset="-34"/>
                 </a:rPr>
-                <a:t>Upperarm</a:t>
+                <a:t>Upper arm</a:t>
               </a:r>
-              <a:endParaRPr lang="de-DE" sz="1200" cap="all" dirty="0" smtClean="0">
-                <a:solidFill>
-                  <a:schemeClr val="tx1"/>
-                </a:solidFill>
-                <a:latin typeface="BankGothic Lt BT" panose="020B0607020203060204" pitchFamily="34" charset="0"/>
-                <a:cs typeface="Leelawadee UI Semilight" panose="020B0402040204020203" pitchFamily="34" charset="-34"/>
-              </a:endParaRPr>
-            </a:p>
-            <a:p>
-              <a:pPr algn="ctr"/>
-              <a:r>
-                <a:rPr lang="de-DE" sz="1200" cap="all" dirty="0" err="1" smtClean="0">
-                  <a:solidFill>
-                    <a:schemeClr val="tx1"/>
-                  </a:solidFill>
-                  <a:latin typeface="BankGothic Lt BT" panose="020B0607020203060204" pitchFamily="34" charset="0"/>
-                  <a:cs typeface="Leelawadee UI Semilight" panose="020B0402040204020203" pitchFamily="34" charset="-34"/>
-                </a:rPr>
-                <a:t>actuator</a:t>
-              </a:r>
-              <a:endParaRPr lang="de-DE" sz="1200" cap="all" dirty="0" smtClean="0">
+              <a:endParaRPr lang="en-GB" sz="1200" b="1" cap="all" dirty="0" smtClean="0">
                 <a:solidFill>
                   <a:schemeClr val="tx1"/>
                 </a:solidFill>
@@ -3884,7 +3820,7 @@
             <a:p>
               <a:pPr algn="ctr"/>
               <a:r>
-                <a:rPr lang="de-DE" sz="1200" cap="all" dirty="0" err="1" smtClean="0">
+                <a:rPr lang="en-GB" sz="1200" b="1" cap="all" dirty="0" smtClean="0">
                   <a:solidFill>
                     <a:schemeClr val="tx1"/>
                   </a:solidFill>
@@ -3893,27 +3829,7 @@
                 </a:rPr>
                 <a:t>Forearm</a:t>
               </a:r>
-              <a:endParaRPr lang="de-DE" sz="1200" cap="all" dirty="0" smtClean="0">
-                <a:solidFill>
-                  <a:schemeClr val="tx1"/>
-                </a:solidFill>
-                <a:latin typeface="BankGothic Lt BT" panose="020B0607020203060204" pitchFamily="34" charset="0"/>
-                <a:cs typeface="Leelawadee UI Semilight" panose="020B0402040204020203" pitchFamily="34" charset="-34"/>
-              </a:endParaRPr>
-            </a:p>
-            <a:p>
-              <a:pPr algn="ctr"/>
-              <a:r>
-                <a:rPr lang="de-DE" sz="1200" cap="all" dirty="0" err="1" smtClean="0">
-                  <a:solidFill>
-                    <a:schemeClr val="tx1"/>
-                  </a:solidFill>
-                  <a:latin typeface="BankGothic Lt BT" panose="020B0607020203060204" pitchFamily="34" charset="0"/>
-                  <a:cs typeface="Leelawadee UI Semilight" panose="020B0402040204020203" pitchFamily="34" charset="-34"/>
-                </a:rPr>
-                <a:t>actuator</a:t>
-              </a:r>
-              <a:endParaRPr lang="de-DE" sz="1200" cap="all" dirty="0" smtClean="0">
+              <a:endParaRPr lang="en-GB" sz="1200" b="1" cap="all" dirty="0" smtClean="0">
                 <a:solidFill>
                   <a:schemeClr val="tx1"/>
                 </a:solidFill>
@@ -3970,36 +3886,16 @@
             <a:p>
               <a:pPr algn="ctr"/>
               <a:r>
-                <a:rPr lang="de-DE" sz="1200" cap="all" dirty="0" err="1" smtClean="0">
+                <a:rPr lang="en-GB" sz="1200" b="1" cap="all" dirty="0" smtClean="0">
                   <a:solidFill>
                     <a:schemeClr val="tx1"/>
                   </a:solidFill>
                   <a:latin typeface="BankGothic Lt BT" panose="020B0607020203060204" pitchFamily="34" charset="0"/>
                   <a:cs typeface="Leelawadee UI Semilight" panose="020B0402040204020203" pitchFamily="34" charset="-34"/>
                 </a:rPr>
-                <a:t>Ellbow</a:t>
+                <a:t>Elbow</a:t>
               </a:r>
-              <a:endParaRPr lang="de-DE" sz="1200" cap="all" dirty="0" smtClean="0">
-                <a:solidFill>
-                  <a:schemeClr val="tx1"/>
-                </a:solidFill>
-                <a:latin typeface="BankGothic Lt BT" panose="020B0607020203060204" pitchFamily="34" charset="0"/>
-                <a:cs typeface="Leelawadee UI Semilight" panose="020B0402040204020203" pitchFamily="34" charset="-34"/>
-              </a:endParaRPr>
-            </a:p>
-            <a:p>
-              <a:pPr algn="ctr"/>
-              <a:r>
-                <a:rPr lang="de-DE" sz="1200" cap="all" dirty="0" err="1" smtClean="0">
-                  <a:solidFill>
-                    <a:schemeClr val="tx1"/>
-                  </a:solidFill>
-                  <a:latin typeface="BankGothic Lt BT" panose="020B0607020203060204" pitchFamily="34" charset="0"/>
-                  <a:cs typeface="Leelawadee UI Semilight" panose="020B0402040204020203" pitchFamily="34" charset="-34"/>
-                </a:rPr>
-                <a:t>actuator</a:t>
-              </a:r>
-              <a:endParaRPr lang="de-DE" sz="1200" cap="all" dirty="0" smtClean="0">
+              <a:endParaRPr lang="en-GB" sz="1200" b="1" cap="all" dirty="0" smtClean="0">
                 <a:solidFill>
                   <a:schemeClr val="tx1"/>
                 </a:solidFill>
@@ -4056,7 +3952,7 @@
             <a:p>
               <a:pPr algn="ctr"/>
               <a:r>
-                <a:rPr lang="de-DE" sz="1200" cap="all" dirty="0" err="1" smtClean="0">
+                <a:rPr lang="en-GB" sz="1200" b="1" cap="all" dirty="0" smtClean="0">
                   <a:solidFill>
                     <a:schemeClr val="tx1"/>
                   </a:solidFill>
@@ -4065,27 +3961,7 @@
                 </a:rPr>
                 <a:t>Wrist</a:t>
               </a:r>
-              <a:endParaRPr lang="de-DE" sz="1200" cap="all" dirty="0" smtClean="0">
-                <a:solidFill>
-                  <a:schemeClr val="tx1"/>
-                </a:solidFill>
-                <a:latin typeface="BankGothic Lt BT" panose="020B0607020203060204" pitchFamily="34" charset="0"/>
-                <a:cs typeface="Leelawadee UI Semilight" panose="020B0402040204020203" pitchFamily="34" charset="-34"/>
-              </a:endParaRPr>
-            </a:p>
-            <a:p>
-              <a:pPr algn="ctr"/>
-              <a:r>
-                <a:rPr lang="de-DE" sz="1200" cap="all" dirty="0" err="1" smtClean="0">
-                  <a:solidFill>
-                    <a:schemeClr val="tx1"/>
-                  </a:solidFill>
-                  <a:latin typeface="BankGothic Lt BT" panose="020B0607020203060204" pitchFamily="34" charset="0"/>
-                  <a:cs typeface="Leelawadee UI Semilight" panose="020B0402040204020203" pitchFamily="34" charset="-34"/>
-                </a:rPr>
-                <a:t>actuator</a:t>
-              </a:r>
-              <a:endParaRPr lang="de-DE" sz="1200" cap="all" dirty="0" smtClean="0">
+              <a:endParaRPr lang="en-GB" sz="1200" b="1" cap="all" dirty="0" smtClean="0">
                 <a:solidFill>
                   <a:schemeClr val="tx1"/>
                 </a:solidFill>
@@ -4142,7 +4018,7 @@
             <a:p>
               <a:pPr algn="ctr"/>
               <a:r>
-                <a:rPr lang="de-DE" sz="1200" cap="all" dirty="0" smtClean="0">
+                <a:rPr lang="en-GB" sz="1200" b="1" cap="all" dirty="0" smtClean="0">
                   <a:solidFill>
                     <a:schemeClr val="tx1"/>
                   </a:solidFill>
@@ -4151,20 +4027,7 @@
                 </a:rPr>
                 <a:t>Hand</a:t>
               </a:r>
-            </a:p>
-            <a:p>
-              <a:pPr algn="ctr"/>
-              <a:r>
-                <a:rPr lang="de-DE" sz="1200" cap="all" dirty="0" err="1" smtClean="0">
-                  <a:solidFill>
-                    <a:schemeClr val="tx1"/>
-                  </a:solidFill>
-                  <a:latin typeface="BankGothic Lt BT" panose="020B0607020203060204" pitchFamily="34" charset="0"/>
-                  <a:cs typeface="Leelawadee UI Semilight" panose="020B0402040204020203" pitchFamily="34" charset="-34"/>
-                </a:rPr>
-                <a:t>actuator</a:t>
-              </a:r>
-              <a:endParaRPr lang="de-DE" sz="1200" cap="all" dirty="0">
+              <a:endParaRPr lang="en-GB" sz="1200" b="1" cap="all" dirty="0" smtClean="0">
                 <a:solidFill>
                   <a:schemeClr val="tx1"/>
                 </a:solidFill>
@@ -4221,7 +4084,7 @@
             <a:p>
               <a:pPr algn="ctr"/>
               <a:r>
-                <a:rPr lang="de-DE" sz="1200" cap="all" dirty="0" smtClean="0">
+                <a:rPr lang="en-GB" sz="1200" b="1" cap="all" dirty="0" smtClean="0">
                   <a:solidFill>
                     <a:schemeClr val="tx1"/>
                   </a:solidFill>
@@ -4230,20 +4093,7 @@
                 </a:rPr>
                 <a:t>Finger</a:t>
               </a:r>
-            </a:p>
-            <a:p>
-              <a:pPr algn="ctr"/>
-              <a:r>
-                <a:rPr lang="de-DE" sz="1200" cap="all" dirty="0" err="1" smtClean="0">
-                  <a:solidFill>
-                    <a:schemeClr val="tx1"/>
-                  </a:solidFill>
-                  <a:latin typeface="BankGothic Lt BT" panose="020B0607020203060204" pitchFamily="34" charset="0"/>
-                  <a:cs typeface="Leelawadee UI Semilight" panose="020B0402040204020203" pitchFamily="34" charset="-34"/>
-                </a:rPr>
-                <a:t>actuator</a:t>
-              </a:r>
-              <a:endParaRPr lang="de-DE" sz="1200" cap="all" dirty="0">
+              <a:endParaRPr lang="en-GB" sz="1200" b="1" cap="all" dirty="0" smtClean="0">
                 <a:solidFill>
                   <a:schemeClr val="tx1"/>
                 </a:solidFill>
@@ -4300,26 +4150,16 @@
             <a:p>
               <a:pPr algn="ctr"/>
               <a:r>
-                <a:rPr lang="de-DE" sz="1200" cap="all" dirty="0" err="1" smtClean="0">
+                <a:rPr lang="en-GB" sz="1200" b="1" cap="all" dirty="0" smtClean="0">
                   <a:solidFill>
                     <a:schemeClr val="tx1"/>
                   </a:solidFill>
                   <a:latin typeface="BankGothic Lt BT" panose="020B0607020203060204" pitchFamily="34" charset="0"/>
                   <a:cs typeface="Leelawadee UI Semilight" panose="020B0402040204020203" pitchFamily="34" charset="-34"/>
                 </a:rPr>
-                <a:t>Broken</a:t>
+                <a:t>Broken light</a:t>
               </a:r>
-              <a:r>
-                <a:rPr lang="de-DE" sz="1200" cap="all" dirty="0" smtClean="0">
-                  <a:solidFill>
-                    <a:schemeClr val="tx1"/>
-                  </a:solidFill>
-                  <a:latin typeface="BankGothic Lt BT" panose="020B0607020203060204" pitchFamily="34" charset="0"/>
-                  <a:cs typeface="Leelawadee UI Semilight" panose="020B0402040204020203" pitchFamily="34" charset="-34"/>
-                </a:rPr>
-                <a:t> light</a:t>
-              </a:r>
-              <a:endParaRPr lang="de-DE" sz="1200" cap="all" dirty="0">
+              <a:endParaRPr lang="en-GB" sz="1200" b="1" cap="all" dirty="0">
                 <a:solidFill>
                   <a:schemeClr val="tx1"/>
                 </a:solidFill>

</xml_diff>